<commit_message>
updated poster and pep8 model
</commit_message>
<xml_diff>
--- a/model/BlackoutAlertPPT.pptx
+++ b/model/BlackoutAlertPPT.pptx
@@ -104,6 +104,11 @@
       </a:defRPr>
     </a:lvl9pPr>
   </p:defaultTextStyle>
+  <p:extLst>
+    <p:ext uri="{EFAFB233-063F-42B5-8137-9DF3F51BA10A}">
+      <p15:sldGuideLst xmlns:p15="http://schemas.microsoft.com/office/powerpoint/2012/main"/>
+    </p:ext>
+  </p:extLst>
 </p:presentation>
 </file>
 
@@ -238,7 +243,7 @@
           <a:p>
             <a:fld id="{D98ADDE3-F09E-4A06-B658-D44B33B834F7}" type="datetimeFigureOut">
               <a:rPr lang="en-US" smtClean="0"/>
-              <a:t>4/29/2018</a:t>
+              <a:t>4/29/18</a:t>
             </a:fld>
             <a:endParaRPr lang="en-US"/>
           </a:p>
@@ -408,7 +413,7 @@
           <a:p>
             <a:fld id="{D98ADDE3-F09E-4A06-B658-D44B33B834F7}" type="datetimeFigureOut">
               <a:rPr lang="en-US" smtClean="0"/>
-              <a:t>4/29/2018</a:t>
+              <a:t>4/29/18</a:t>
             </a:fld>
             <a:endParaRPr lang="en-US"/>
           </a:p>
@@ -588,7 +593,7 @@
           <a:p>
             <a:fld id="{D98ADDE3-F09E-4A06-B658-D44B33B834F7}" type="datetimeFigureOut">
               <a:rPr lang="en-US" smtClean="0"/>
-              <a:t>4/29/2018</a:t>
+              <a:t>4/29/18</a:t>
             </a:fld>
             <a:endParaRPr lang="en-US"/>
           </a:p>
@@ -758,7 +763,7 @@
           <a:p>
             <a:fld id="{D98ADDE3-F09E-4A06-B658-D44B33B834F7}" type="datetimeFigureOut">
               <a:rPr lang="en-US" smtClean="0"/>
-              <a:t>4/29/2018</a:t>
+              <a:t>4/29/18</a:t>
             </a:fld>
             <a:endParaRPr lang="en-US"/>
           </a:p>
@@ -1002,7 +1007,7 @@
           <a:p>
             <a:fld id="{D98ADDE3-F09E-4A06-B658-D44B33B834F7}" type="datetimeFigureOut">
               <a:rPr lang="en-US" smtClean="0"/>
-              <a:t>4/29/2018</a:t>
+              <a:t>4/29/18</a:t>
             </a:fld>
             <a:endParaRPr lang="en-US"/>
           </a:p>
@@ -1234,7 +1239,7 @@
           <a:p>
             <a:fld id="{D98ADDE3-F09E-4A06-B658-D44B33B834F7}" type="datetimeFigureOut">
               <a:rPr lang="en-US" smtClean="0"/>
-              <a:t>4/29/2018</a:t>
+              <a:t>4/29/18</a:t>
             </a:fld>
             <a:endParaRPr lang="en-US"/>
           </a:p>
@@ -1601,7 +1606,7 @@
           <a:p>
             <a:fld id="{D98ADDE3-F09E-4A06-B658-D44B33B834F7}" type="datetimeFigureOut">
               <a:rPr lang="en-US" smtClean="0"/>
-              <a:t>4/29/2018</a:t>
+              <a:t>4/29/18</a:t>
             </a:fld>
             <a:endParaRPr lang="en-US"/>
           </a:p>
@@ -1719,7 +1724,7 @@
           <a:p>
             <a:fld id="{D98ADDE3-F09E-4A06-B658-D44B33B834F7}" type="datetimeFigureOut">
               <a:rPr lang="en-US" smtClean="0"/>
-              <a:t>4/29/2018</a:t>
+              <a:t>4/29/18</a:t>
             </a:fld>
             <a:endParaRPr lang="en-US"/>
           </a:p>
@@ -1814,7 +1819,7 @@
           <a:p>
             <a:fld id="{D98ADDE3-F09E-4A06-B658-D44B33B834F7}" type="datetimeFigureOut">
               <a:rPr lang="en-US" smtClean="0"/>
-              <a:t>4/29/2018</a:t>
+              <a:t>4/29/18</a:t>
             </a:fld>
             <a:endParaRPr lang="en-US"/>
           </a:p>
@@ -2091,7 +2096,7 @@
           <a:p>
             <a:fld id="{D98ADDE3-F09E-4A06-B658-D44B33B834F7}" type="datetimeFigureOut">
               <a:rPr lang="en-US" smtClean="0"/>
-              <a:t>4/29/2018</a:t>
+              <a:t>4/29/18</a:t>
             </a:fld>
             <a:endParaRPr lang="en-US"/>
           </a:p>
@@ -2348,7 +2353,7 @@
           <a:p>
             <a:fld id="{D98ADDE3-F09E-4A06-B658-D44B33B834F7}" type="datetimeFigureOut">
               <a:rPr lang="en-US" smtClean="0"/>
-              <a:t>4/29/2018</a:t>
+              <a:t>4/29/18</a:t>
             </a:fld>
             <a:endParaRPr lang="en-US"/>
           </a:p>
@@ -2561,7 +2566,7 @@
           <a:p>
             <a:fld id="{D98ADDE3-F09E-4A06-B658-D44B33B834F7}" type="datetimeFigureOut">
               <a:rPr lang="en-US" smtClean="0"/>
-              <a:t>4/29/2018</a:t>
+              <a:t>4/29/18</a:t>
             </a:fld>
             <a:endParaRPr lang="en-US"/>
           </a:p>
@@ -2971,7 +2976,7 @@
           <p:cNvPr id="34" name="Picture 33">
             <a:extLst>
               <a:ext uri="{FF2B5EF4-FFF2-40B4-BE49-F238E27FC236}">
-                <a16:creationId xmlns:a16="http://schemas.microsoft.com/office/drawing/2014/main" id="{3BE2A215-C30B-4148-BBB9-701973F62C8D}"/>
+                <a16:creationId xmlns:a16="http://schemas.microsoft.com/office/drawing/2014/main" xmlns="" id="{3BE2A215-C30B-4148-BBB9-701973F62C8D}"/>
               </a:ext>
             </a:extLst>
           </p:cNvPr>
@@ -3007,7 +3012,7 @@
           <p:cNvPr id="32" name="Picture 31">
             <a:extLst>
               <a:ext uri="{FF2B5EF4-FFF2-40B4-BE49-F238E27FC236}">
-                <a16:creationId xmlns:a16="http://schemas.microsoft.com/office/drawing/2014/main" id="{990CC891-C2ED-4D0E-BD0E-22E0238BA513}"/>
+                <a16:creationId xmlns:a16="http://schemas.microsoft.com/office/drawing/2014/main" xmlns="" id="{990CC891-C2ED-4D0E-BD0E-22E0238BA513}"/>
               </a:ext>
             </a:extLst>
           </p:cNvPr>
@@ -3043,7 +3048,7 @@
           <p:cNvPr id="4" name="TextBox 3">
             <a:extLst>
               <a:ext uri="{FF2B5EF4-FFF2-40B4-BE49-F238E27FC236}">
-                <a16:creationId xmlns:a16="http://schemas.microsoft.com/office/drawing/2014/main" id="{04E37C77-3DA9-42EC-A444-C31C4B7C9C79}"/>
+                <a16:creationId xmlns:a16="http://schemas.microsoft.com/office/drawing/2014/main" xmlns="" id="{04E37C77-3DA9-42EC-A444-C31C4B7C9C79}"/>
               </a:ext>
             </a:extLst>
           </p:cNvPr>
@@ -3086,38 +3091,45 @@
                 <a:latin typeface="Arial" panose="020B0604020202020204" pitchFamily="34" charset="0"/>
                 <a:cs typeface="Arial" panose="020B0604020202020204" pitchFamily="34" charset="0"/>
               </a:rPr>
-              <a:t>Phone Application for Classifying Intoxication Level</a:t>
+              <a:t>Phone Application for Classifying Intoxication </a:t>
+            </a:r>
+            <a:r>
+              <a:rPr lang="en-US" sz="7200" dirty="0" smtClean="0">
+                <a:latin typeface="Arial" panose="020B0604020202020204" pitchFamily="34" charset="0"/>
+                <a:cs typeface="Arial" panose="020B0604020202020204" pitchFamily="34" charset="0"/>
+              </a:rPr>
+              <a:t>Level</a:t>
             </a:r>
           </a:p>
           <a:p>
             <a:pPr algn="ctr"/>
-            <a:endParaRPr lang="en-US" sz="7200" dirty="0">
+            <a:endParaRPr lang="en-US" sz="7200" dirty="0" smtClean="0">
               <a:latin typeface="Arial" panose="020B0604020202020204" pitchFamily="34" charset="0"/>
               <a:cs typeface="Arial" panose="020B0604020202020204" pitchFamily="34" charset="0"/>
             </a:endParaRPr>
           </a:p>
           <a:p>
             <a:pPr algn="ctr"/>
+            <a:r>
+              <a:rPr lang="en-US" sz="6000" dirty="0" err="1" smtClean="0">
+                <a:latin typeface="Arial" panose="020B0604020202020204" pitchFamily="34" charset="0"/>
+                <a:cs typeface="Arial" panose="020B0604020202020204" pitchFamily="34" charset="0"/>
+              </a:rPr>
+              <a:t>Faadhil</a:t>
+            </a:r>
+            <a:r>
+              <a:rPr lang="en-US" sz="6000" dirty="0" smtClean="0">
+                <a:latin typeface="Arial" panose="020B0604020202020204" pitchFamily="34" charset="0"/>
+                <a:cs typeface="Arial" panose="020B0604020202020204" pitchFamily="34" charset="0"/>
+              </a:rPr>
+              <a:t> </a:t>
+            </a:r>
             <a:r>
               <a:rPr lang="en-US" sz="6000" dirty="0">
                 <a:latin typeface="Arial" panose="020B0604020202020204" pitchFamily="34" charset="0"/>
                 <a:cs typeface="Arial" panose="020B0604020202020204" pitchFamily="34" charset="0"/>
               </a:rPr>
-              <a:t>Faadhil Moheed (fm363), Julian </a:t>
-            </a:r>
-            <a:r>
-              <a:rPr lang="en-US" sz="6000" dirty="0" err="1">
-                <a:latin typeface="Arial" panose="020B0604020202020204" pitchFamily="34" charset="0"/>
-                <a:cs typeface="Arial" panose="020B0604020202020204" pitchFamily="34" charset="0"/>
-              </a:rPr>
-              <a:t>Massarani</a:t>
-            </a:r>
-            <a:r>
-              <a:rPr lang="en-US" sz="6000" dirty="0">
-                <a:latin typeface="Arial" panose="020B0604020202020204" pitchFamily="34" charset="0"/>
-                <a:cs typeface="Arial" panose="020B0604020202020204" pitchFamily="34" charset="0"/>
-              </a:rPr>
-              <a:t> (jm2249)</a:t>
+              <a:t>Moheed (fm363), Julian Massarani (jm2249)</a:t>
             </a:r>
           </a:p>
           <a:p>
@@ -3137,7 +3149,7 @@
           <p:cNvPr id="9" name="TextBox 8">
             <a:extLst>
               <a:ext uri="{FF2B5EF4-FFF2-40B4-BE49-F238E27FC236}">
-                <a16:creationId xmlns:a16="http://schemas.microsoft.com/office/drawing/2014/main" id="{F17BBC8C-0E86-41A6-BA5E-8879100D5F2C}"/>
+                <a16:creationId xmlns:a16="http://schemas.microsoft.com/office/drawing/2014/main" xmlns="" id="{F17BBC8C-0E86-41A6-BA5E-8879100D5F2C}"/>
               </a:ext>
             </a:extLst>
           </p:cNvPr>
@@ -3272,7 +3284,7 @@
           <p:cNvPr id="11" name="Picture 10">
             <a:extLst>
               <a:ext uri="{FF2B5EF4-FFF2-40B4-BE49-F238E27FC236}">
-                <a16:creationId xmlns:a16="http://schemas.microsoft.com/office/drawing/2014/main" id="{E3964F18-2BE0-4B1D-B639-B4A0A599A959}"/>
+                <a16:creationId xmlns:a16="http://schemas.microsoft.com/office/drawing/2014/main" xmlns="" id="{E3964F18-2BE0-4B1D-B639-B4A0A599A959}"/>
               </a:ext>
             </a:extLst>
           </p:cNvPr>
@@ -3308,7 +3320,7 @@
           <p:cNvPr id="13" name="Picture 12">
             <a:extLst>
               <a:ext uri="{FF2B5EF4-FFF2-40B4-BE49-F238E27FC236}">
-                <a16:creationId xmlns:a16="http://schemas.microsoft.com/office/drawing/2014/main" id="{7B613F11-6C93-4C87-A37A-3E0B9C3A7AFB}"/>
+                <a16:creationId xmlns:a16="http://schemas.microsoft.com/office/drawing/2014/main" xmlns="" id="{7B613F11-6C93-4C87-A37A-3E0B9C3A7AFB}"/>
               </a:ext>
             </a:extLst>
           </p:cNvPr>
@@ -3344,7 +3356,7 @@
           <p:cNvPr id="24" name="TextBox 23">
             <a:extLst>
               <a:ext uri="{FF2B5EF4-FFF2-40B4-BE49-F238E27FC236}">
-                <a16:creationId xmlns:a16="http://schemas.microsoft.com/office/drawing/2014/main" id="{CA653031-1D0D-4336-BABE-946A8431BFCF}"/>
+                <a16:creationId xmlns:a16="http://schemas.microsoft.com/office/drawing/2014/main" xmlns="" id="{CA653031-1D0D-4336-BABE-946A8431BFCF}"/>
               </a:ext>
             </a:extLst>
           </p:cNvPr>
@@ -3354,7 +3366,7 @@
         <p:spPr>
           <a:xfrm>
             <a:off x="22218627" y="6978315"/>
-            <a:ext cx="9926051" cy="31239321"/>
+            <a:ext cx="9926051" cy="32008763"/>
           </a:xfrm>
           <a:prstGeom prst="rect">
             <a:avLst/>
@@ -3368,14 +3380,12 @@
           <a:lstStyle/>
           <a:p>
             <a:r>
-              <a:rPr lang="en-US" sz="4400" b="1" dirty="0">
+              <a:rPr lang="en-US" sz="4400" b="1" dirty="0" smtClean="0">
                 <a:latin typeface="Arial" panose="020B0604020202020204" pitchFamily="34" charset="0"/>
                 <a:cs typeface="Arial" panose="020B0604020202020204" pitchFamily="34" charset="0"/>
               </a:rPr>
               <a:t>RESULTS</a:t>
             </a:r>
-          </a:p>
-          <a:p>
             <a:endParaRPr lang="en-US" sz="4400" b="1" dirty="0">
               <a:latin typeface="Arial" panose="020B0604020202020204" pitchFamily="34" charset="0"/>
               <a:cs typeface="Arial" panose="020B0604020202020204" pitchFamily="34" charset="0"/>
@@ -3386,23 +3396,97 @@
               <a:rPr lang="en-US" sz="3200" dirty="0">
                 <a:cs typeface="Arial" panose="020B0604020202020204" pitchFamily="34" charset="0"/>
               </a:rPr>
-              <a:t>Number of testers: 10 (1 round sober, 1 round “drunk”)</a:t>
-            </a:r>
-          </a:p>
-          <a:p>
+              <a:t>Number of testers: 10 (1 </a:t>
+            </a:r>
+            <a:r>
+              <a:rPr lang="en-US" sz="3200" dirty="0" smtClean="0">
+                <a:cs typeface="Arial" panose="020B0604020202020204" pitchFamily="34" charset="0"/>
+              </a:rPr>
+              <a:t>sober</a:t>
+            </a:r>
             <a:r>
               <a:rPr lang="en-US" sz="3200" dirty="0">
                 <a:cs typeface="Arial" panose="020B0604020202020204" pitchFamily="34" charset="0"/>
               </a:rPr>
-              <a:t>The plots for each activity are as follows:</a:t>
-            </a:r>
+              <a:t>, 1 </a:t>
+            </a:r>
+            <a:r>
+              <a:rPr lang="en-US" sz="3200" dirty="0" smtClean="0">
+                <a:cs typeface="Arial" panose="020B0604020202020204" pitchFamily="34" charset="0"/>
+              </a:rPr>
+              <a:t>“</a:t>
+            </a:r>
+            <a:r>
+              <a:rPr lang="en-US" sz="3200" dirty="0">
+                <a:cs typeface="Arial" panose="020B0604020202020204" pitchFamily="34" charset="0"/>
+              </a:rPr>
+              <a:t>drunk</a:t>
+            </a:r>
+            <a:r>
+              <a:rPr lang="en-US" sz="3200" dirty="0" smtClean="0">
+                <a:cs typeface="Arial" panose="020B0604020202020204" pitchFamily="34" charset="0"/>
+              </a:rPr>
+              <a:t>”, 1 drunk goggles)</a:t>
+            </a:r>
+            <a:endParaRPr lang="en-US" sz="3200" dirty="0">
+              <a:cs typeface="Arial" panose="020B0604020202020204" pitchFamily="34" charset="0"/>
+            </a:endParaRPr>
+          </a:p>
+          <a:p>
+            <a:r>
+              <a:rPr lang="en-US" sz="3200" dirty="0">
+                <a:cs typeface="Arial" panose="020B0604020202020204" pitchFamily="34" charset="0"/>
+              </a:rPr>
+              <a:t>The plots for each activity are as follows</a:t>
+            </a:r>
+            <a:r>
+              <a:rPr lang="en-US" sz="3200" dirty="0" smtClean="0">
+                <a:cs typeface="Arial" panose="020B0604020202020204" pitchFamily="34" charset="0"/>
+              </a:rPr>
+              <a:t>:</a:t>
+            </a:r>
+          </a:p>
+          <a:p>
+            <a:r>
+              <a:rPr lang="en-US" sz="3200" dirty="0" smtClean="0">
+                <a:cs typeface="Arial" panose="020B0604020202020204" pitchFamily="34" charset="0"/>
+              </a:rPr>
+              <a:t>KEY: (0 = sober, 1 = “drunk”, 2 = drunk goggles or “coma”)</a:t>
+            </a:r>
+            <a:endParaRPr lang="en-US" sz="3200" dirty="0">
+              <a:cs typeface="Arial" panose="020B0604020202020204" pitchFamily="34" charset="0"/>
+            </a:endParaRPr>
           </a:p>
           <a:p>
             <a:r>
               <a:rPr lang="en-US" sz="3200" u="sng" dirty="0">
                 <a:cs typeface="Arial" panose="020B0604020202020204" pitchFamily="34" charset="0"/>
               </a:rPr>
-              <a:t>Stand Still</a:t>
+              <a:t>Stand </a:t>
+            </a:r>
+            <a:r>
+              <a:rPr lang="en-US" sz="3200" u="sng" dirty="0" smtClean="0">
+                <a:cs typeface="Arial" panose="020B0604020202020204" pitchFamily="34" charset="0"/>
+              </a:rPr>
+              <a:t>Still </a:t>
+            </a:r>
+            <a:r>
+              <a:rPr lang="mr-IN" sz="3200" dirty="0">
+                <a:cs typeface="Arial" panose="020B0604020202020204" pitchFamily="34" charset="0"/>
+              </a:rPr>
+              <a:t>–</a:t>
+            </a:r>
+            <a:r>
+              <a:rPr lang="en-US" sz="3200" dirty="0">
+                <a:cs typeface="Arial" panose="020B0604020202020204" pitchFamily="34" charset="0"/>
+              </a:rPr>
+              <a:t> Classifier Accuracy: </a:t>
+            </a:r>
+            <a:r>
+              <a:rPr lang="en-US" sz="3200" dirty="0" smtClean="0">
+                <a:cs typeface="Arial" panose="020B0604020202020204" pitchFamily="34" charset="0"/>
+              </a:rPr>
+              <a:t>81.30%</a:t>
             </a:r>
             <a:endParaRPr lang="en-US" sz="3200" dirty="0">
               <a:cs typeface="Arial" panose="020B0604020202020204" pitchFamily="34" charset="0"/>
@@ -3461,8 +3545,41 @@
               <a:rPr lang="en-US" sz="3200" u="sng" dirty="0">
                 <a:cs typeface="Arial" panose="020B0604020202020204" pitchFamily="34" charset="0"/>
               </a:rPr>
-              <a:t>Straight Line</a:t>
-            </a:r>
+              <a:t>Straight </a:t>
+            </a:r>
+            <a:r>
+              <a:rPr lang="en-US" sz="3200" u="sng" dirty="0" smtClean="0">
+                <a:cs typeface="Arial" panose="020B0604020202020204" pitchFamily="34" charset="0"/>
+              </a:rPr>
+              <a:t>Line </a:t>
+            </a:r>
+            <a:r>
+              <a:rPr lang="mr-IN" sz="3200" dirty="0" smtClean="0">
+                <a:cs typeface="Arial" panose="020B0604020202020204" pitchFamily="34" charset="0"/>
+              </a:rPr>
+              <a:t>–</a:t>
+            </a:r>
+            <a:r>
+              <a:rPr lang="en-US" sz="3200" dirty="0" smtClean="0">
+                <a:cs typeface="Arial" panose="020B0604020202020204" pitchFamily="34" charset="0"/>
+              </a:rPr>
+              <a:t> </a:t>
+            </a:r>
+            <a:r>
+              <a:rPr lang="en-US" sz="3200" dirty="0">
+                <a:cs typeface="Arial" panose="020B0604020202020204" pitchFamily="34" charset="0"/>
+              </a:rPr>
+              <a:t>Classifier Accuracy: </a:t>
+            </a:r>
+            <a:r>
+              <a:rPr lang="en-US" sz="3200" dirty="0" smtClean="0">
+                <a:cs typeface="Arial" panose="020B0604020202020204" pitchFamily="34" charset="0"/>
+              </a:rPr>
+              <a:t>71.95%</a:t>
+            </a:r>
+            <a:endParaRPr lang="en-US" sz="3200" u="sng" dirty="0">
+              <a:cs typeface="Arial" panose="020B0604020202020204" pitchFamily="34" charset="0"/>
+            </a:endParaRPr>
           </a:p>
           <a:p>
             <a:pPr fontAlgn="base"/>
@@ -3525,8 +3642,35 @@
               <a:rPr lang="en-US" sz="3200" u="sng" dirty="0">
                 <a:cs typeface="Arial" panose="020B0604020202020204" pitchFamily="34" charset="0"/>
               </a:rPr>
-              <a:t>Heel To Toe</a:t>
-            </a:r>
+              <a:t>Heel To </a:t>
+            </a:r>
+            <a:r>
+              <a:rPr lang="en-US" sz="3200" u="sng" dirty="0" smtClean="0">
+                <a:cs typeface="Arial" panose="020B0604020202020204" pitchFamily="34" charset="0"/>
+              </a:rPr>
+              <a:t>Toe </a:t>
+            </a:r>
+            <a:r>
+              <a:rPr lang="mr-IN" sz="3200" dirty="0" smtClean="0">
+                <a:cs typeface="Arial" panose="020B0604020202020204" pitchFamily="34" charset="0"/>
+              </a:rPr>
+              <a:t>–</a:t>
+            </a:r>
+            <a:r>
+              <a:rPr lang="en-US" sz="3200" dirty="0">
+                <a:cs typeface="Arial" panose="020B0604020202020204" pitchFamily="34" charset="0"/>
+              </a:rPr>
+              <a:t> Classifier Accuracy: </a:t>
+            </a:r>
+            <a:r>
+              <a:rPr lang="en-US" sz="3200" dirty="0" smtClean="0">
+                <a:cs typeface="Arial" panose="020B0604020202020204" pitchFamily="34" charset="0"/>
+              </a:rPr>
+              <a:t>94.71%</a:t>
+            </a:r>
+            <a:endParaRPr lang="en-US" sz="3200" dirty="0">
+              <a:cs typeface="Arial" panose="020B0604020202020204" pitchFamily="34" charset="0"/>
+            </a:endParaRPr>
           </a:p>
           <a:p>
             <a:pPr fontAlgn="base"/>
@@ -3589,8 +3733,35 @@
               <a:rPr lang="en-US" sz="3200" u="sng" dirty="0">
                 <a:cs typeface="Arial" panose="020B0604020202020204" pitchFamily="34" charset="0"/>
               </a:rPr>
-              <a:t>One Leg Balance</a:t>
-            </a:r>
+              <a:t>One Leg </a:t>
+            </a:r>
+            <a:r>
+              <a:rPr lang="en-US" sz="3200" u="sng" dirty="0">
+                <a:cs typeface="Arial" panose="020B0604020202020204" pitchFamily="34" charset="0"/>
+              </a:rPr>
+              <a:t>Balance </a:t>
+            </a:r>
+            <a:r>
+              <a:rPr lang="mr-IN" sz="3200" dirty="0">
+                <a:cs typeface="Arial" panose="020B0604020202020204" pitchFamily="34" charset="0"/>
+              </a:rPr>
+              <a:t>–</a:t>
+            </a:r>
+            <a:r>
+              <a:rPr lang="en-US" sz="3200" dirty="0">
+                <a:cs typeface="Arial" panose="020B0604020202020204" pitchFamily="34" charset="0"/>
+              </a:rPr>
+              <a:t> Classifier Accuracy: 92.29</a:t>
+            </a:r>
+            <a:r>
+              <a:rPr lang="en-US" sz="3200" dirty="0" smtClean="0">
+                <a:cs typeface="Arial" panose="020B0604020202020204" pitchFamily="34" charset="0"/>
+              </a:rPr>
+              <a:t>%</a:t>
+            </a:r>
+            <a:endParaRPr lang="en-US" sz="3200" u="sng" dirty="0">
+              <a:cs typeface="Arial" panose="020B0604020202020204" pitchFamily="34" charset="0"/>
+            </a:endParaRPr>
           </a:p>
           <a:p>
             <a:pPr fontAlgn="base"/>
@@ -3665,61 +3836,41 @@
           </a:p>
           <a:p>
             <a:pPr fontAlgn="base"/>
-            <a:endParaRPr lang="en-US" sz="4400" b="1" dirty="0">
-              <a:latin typeface="Arial" panose="020B0604020202020204" pitchFamily="34" charset="0"/>
-              <a:cs typeface="Arial" panose="020B0604020202020204" pitchFamily="34" charset="0"/>
-            </a:endParaRPr>
+            <a:r>
+              <a:rPr lang="en-US" sz="3000" dirty="0" smtClean="0">
+                <a:latin typeface="Calibri" charset="0"/>
+                <a:ea typeface="Calibri" charset="0"/>
+                <a:cs typeface="Calibri" charset="0"/>
+              </a:rPr>
+              <a:t>The One Leg Balance and Heel To Toe models appear to be our best predictors. This can be seen by both the high accuracy score as well as the separation of data into three decision regions.  The others performed well, but it appears to be more of an overfitting of our classifier due to limited data and/or outliers (which we hope to remove in the future). Precision and recall scores for each task was within +/- 3 of accuracy. </a:t>
+            </a:r>
+            <a:r>
+              <a:rPr lang="en-US" sz="3200" b="1" dirty="0" smtClean="0">
+                <a:cs typeface="Arial" panose="020B0604020202020204" pitchFamily="34" charset="0"/>
+              </a:rPr>
+              <a:t>Future </a:t>
+            </a:r>
+            <a:r>
+              <a:rPr lang="en-US" sz="3200" b="1" dirty="0">
+                <a:cs typeface="Arial" panose="020B0604020202020204" pitchFamily="34" charset="0"/>
+              </a:rPr>
+              <a:t>Work:</a:t>
+            </a:r>
           </a:p>
           <a:p>
             <a:pPr fontAlgn="base"/>
             <a:r>
-              <a:rPr lang="en-US" sz="4400" dirty="0">
-                <a:latin typeface="Arial" panose="020B0604020202020204" pitchFamily="34" charset="0"/>
-                <a:cs typeface="Arial" panose="020B0604020202020204" pitchFamily="34" charset="0"/>
-              </a:rPr>
-              <a:t>JULIAN DISCUSS RESULTS HERE</a:t>
-            </a:r>
-          </a:p>
-          <a:p>
-            <a:pPr fontAlgn="base"/>
-            <a:endParaRPr lang="en-US" sz="4400" dirty="0">
-              <a:latin typeface="Arial" panose="020B0604020202020204" pitchFamily="34" charset="0"/>
-              <a:cs typeface="Arial" panose="020B0604020202020204" pitchFamily="34" charset="0"/>
-            </a:endParaRPr>
-          </a:p>
-          <a:p>
-            <a:pPr fontAlgn="base"/>
-            <a:r>
-              <a:rPr lang="en-US" sz="3200" b="1" dirty="0">
-                <a:cs typeface="Arial" panose="020B0604020202020204" pitchFamily="34" charset="0"/>
-              </a:rPr>
-              <a:t>Future Work:</a:t>
-            </a:r>
-          </a:p>
-          <a:p>
-            <a:pPr fontAlgn="base"/>
-            <a:endParaRPr lang="en-US" sz="3200" b="1" dirty="0">
-              <a:cs typeface="Arial" panose="020B0604020202020204" pitchFamily="34" charset="0"/>
-            </a:endParaRPr>
-          </a:p>
-          <a:p>
-            <a:pPr fontAlgn="base"/>
-            <a:r>
-              <a:rPr lang="en-US" sz="4400" dirty="0">
-                <a:latin typeface="Arial" panose="020B0604020202020204" pitchFamily="34" charset="0"/>
-                <a:cs typeface="Arial" panose="020B0604020202020204" pitchFamily="34" charset="0"/>
-              </a:rPr>
-              <a:t>JULIAN DISCUSS FUTURE WORK</a:t>
-            </a:r>
-            <a:endParaRPr lang="en-US" sz="3200" b="1" dirty="0">
-              <a:cs typeface="Arial" panose="020B0604020202020204" pitchFamily="34" charset="0"/>
-            </a:endParaRPr>
-          </a:p>
-          <a:p>
-            <a:pPr fontAlgn="base"/>
-            <a:endParaRPr lang="en-US" sz="4400" b="1" dirty="0">
-              <a:latin typeface="Arial" panose="020B0604020202020204" pitchFamily="34" charset="0"/>
-              <a:cs typeface="Arial" panose="020B0604020202020204" pitchFamily="34" charset="0"/>
+              <a:rPr lang="en-US" sz="3000" dirty="0" smtClean="0">
+                <a:latin typeface="Calibri" charset="0"/>
+                <a:ea typeface="Calibri" charset="0"/>
+                <a:cs typeface="Calibri" charset="0"/>
+              </a:rPr>
+              <a:t>All of the classification thus far was from data collected in a controlled setting. For the future, we are going to find a way to combine our 4 models to run in the background, and classify a user’s intoxication while they are performing any activity. We also want to incorporate the edit distance feature.</a:t>
+            </a:r>
+            <a:endParaRPr lang="en-US" sz="3000" dirty="0">
+              <a:latin typeface="Calibri" charset="0"/>
+              <a:ea typeface="Calibri" charset="0"/>
+              <a:cs typeface="Calibri" charset="0"/>
             </a:endParaRPr>
           </a:p>
         </p:txBody>
@@ -3729,7 +3880,7 @@
           <p:cNvPr id="25" name="TextBox 24">
             <a:extLst>
               <a:ext uri="{FF2B5EF4-FFF2-40B4-BE49-F238E27FC236}">
-                <a16:creationId xmlns:a16="http://schemas.microsoft.com/office/drawing/2014/main" id="{367A210A-FA8B-4ABA-982B-43F2878E2E8D}"/>
+                <a16:creationId xmlns:a16="http://schemas.microsoft.com/office/drawing/2014/main" xmlns="" id="{367A210A-FA8B-4ABA-982B-43F2878E2E8D}"/>
               </a:ext>
             </a:extLst>
           </p:cNvPr>
@@ -3814,7 +3965,7 @@
           <p:cNvPr id="26" name="TextBox 25">
             <a:extLst>
               <a:ext uri="{FF2B5EF4-FFF2-40B4-BE49-F238E27FC236}">
-                <a16:creationId xmlns:a16="http://schemas.microsoft.com/office/drawing/2014/main" id="{45A8335A-3FBC-427F-A042-345A950B0A33}"/>
+                <a16:creationId xmlns:a16="http://schemas.microsoft.com/office/drawing/2014/main" xmlns="" id="{45A8335A-3FBC-427F-A042-345A950B0A33}"/>
               </a:ext>
             </a:extLst>
           </p:cNvPr>
@@ -3824,7 +3975,7 @@
         <p:spPr>
           <a:xfrm>
             <a:off x="11518387" y="6978315"/>
-            <a:ext cx="9926051" cy="29146440"/>
+            <a:ext cx="9926051" cy="27853779"/>
           </a:xfrm>
           <a:prstGeom prst="rect">
             <a:avLst/>
@@ -3987,68 +4138,324 @@
                 <a:cs typeface="Arial" panose="020B0604020202020204" pitchFamily="34" charset="0"/>
                 <a:sym typeface="Wingdings" panose="05000000000000000000" pitchFamily="2" charset="2"/>
               </a:rPr>
-              <a:t>: this sensor measures </a:t>
+              <a:t>: </a:t>
+            </a:r>
+            <a:r>
+              <a:rPr lang="en-US" sz="3000" dirty="0">
+                <a:cs typeface="Arial" panose="020B0604020202020204" pitchFamily="34" charset="0"/>
+                <a:sym typeface="Wingdings" panose="05000000000000000000" pitchFamily="2" charset="2"/>
+              </a:rPr>
+              <a:t>this sensor measures </a:t>
             </a:r>
           </a:p>
           <a:p>
             <a:pPr lvl="1"/>
             <a:r>
+              <a:rPr lang="en-US" sz="3000" dirty="0">
+                <a:cs typeface="Arial" panose="020B0604020202020204" pitchFamily="34" charset="0"/>
+                <a:sym typeface="Wingdings" panose="05000000000000000000" pitchFamily="2" charset="2"/>
+              </a:rPr>
+              <a:t>the value of a change in velocity for </a:t>
+            </a:r>
+          </a:p>
+          <a:p>
+            <a:pPr lvl="1"/>
+            <a:r>
+              <a:rPr lang="en-US" sz="3000" dirty="0">
+                <a:cs typeface="Arial" panose="020B0604020202020204" pitchFamily="34" charset="0"/>
+                <a:sym typeface="Wingdings" panose="05000000000000000000" pitchFamily="2" charset="2"/>
+              </a:rPr>
+              <a:t>all axes (x, y, z). </a:t>
+            </a:r>
+            <a:r>
+              <a:rPr lang="en-US" sz="3000" dirty="0" smtClean="0">
+                <a:cs typeface="Arial" panose="020B0604020202020204" pitchFamily="34" charset="0"/>
+                <a:sym typeface="Wingdings" panose="05000000000000000000" pitchFamily="2" charset="2"/>
+              </a:rPr>
+              <a:t>Direction does not matter </a:t>
+            </a:r>
+          </a:p>
+          <a:p>
+            <a:pPr lvl="1"/>
+            <a:r>
+              <a:rPr lang="en-US" sz="3000" dirty="0" smtClean="0">
+                <a:cs typeface="Arial" panose="020B0604020202020204" pitchFamily="34" charset="0"/>
+                <a:sym typeface="Wingdings" panose="05000000000000000000" pitchFamily="2" charset="2"/>
+              </a:rPr>
+              <a:t>much in this case, so we computed </a:t>
+            </a:r>
+          </a:p>
+          <a:p>
+            <a:pPr lvl="1"/>
+            <a:r>
+              <a:rPr lang="en-US" sz="3000" dirty="0" smtClean="0">
+                <a:cs typeface="Arial" panose="020B0604020202020204" pitchFamily="34" charset="0"/>
+                <a:sym typeface="Wingdings" panose="05000000000000000000" pitchFamily="2" charset="2"/>
+              </a:rPr>
+              <a:t>the magnitude of the acceleration </a:t>
+            </a:r>
+          </a:p>
+          <a:p>
+            <a:pPr lvl="1"/>
+            <a:r>
+              <a:rPr lang="en-US" sz="3000" dirty="0">
+                <a:cs typeface="Arial" panose="020B0604020202020204" pitchFamily="34" charset="0"/>
+                <a:sym typeface="Wingdings" panose="05000000000000000000" pitchFamily="2" charset="2"/>
+              </a:rPr>
+              <a:t>v</a:t>
+            </a:r>
+            <a:r>
+              <a:rPr lang="en-US" sz="3000" dirty="0" smtClean="0">
+                <a:cs typeface="Arial" panose="020B0604020202020204" pitchFamily="34" charset="0"/>
+                <a:sym typeface="Wingdings" panose="05000000000000000000" pitchFamily="2" charset="2"/>
+              </a:rPr>
+              <a:t>ector to use in our model.</a:t>
+            </a:r>
+          </a:p>
+          <a:p>
+            <a:pPr lvl="1"/>
+            <a:r>
+              <a:rPr lang="en-US" sz="3000" dirty="0" smtClean="0">
+                <a:cs typeface="Arial" panose="020B0604020202020204" pitchFamily="34" charset="0"/>
+                <a:sym typeface="Wingdings" panose="05000000000000000000" pitchFamily="2" charset="2"/>
+              </a:rPr>
+              <a:t>This </a:t>
+            </a:r>
+            <a:r>
+              <a:rPr lang="en-US" sz="3000" dirty="0">
+                <a:cs typeface="Arial" panose="020B0604020202020204" pitchFamily="34" charset="0"/>
+                <a:sym typeface="Wingdings" panose="05000000000000000000" pitchFamily="2" charset="2"/>
+              </a:rPr>
+              <a:t>is </a:t>
+            </a:r>
+            <a:r>
+              <a:rPr lang="en-US" sz="3000" dirty="0" smtClean="0">
+                <a:cs typeface="Arial" panose="020B0604020202020204" pitchFamily="34" charset="0"/>
+                <a:sym typeface="Wingdings" panose="05000000000000000000" pitchFamily="2" charset="2"/>
+              </a:rPr>
+              <a:t>particularly useful </a:t>
+            </a:r>
+            <a:r>
+              <a:rPr lang="en-US" sz="3000" dirty="0">
+                <a:cs typeface="Arial" panose="020B0604020202020204" pitchFamily="34" charset="0"/>
+                <a:sym typeface="Wingdings" panose="05000000000000000000" pitchFamily="2" charset="2"/>
+              </a:rPr>
+              <a:t>for recording </a:t>
+            </a:r>
+            <a:endParaRPr lang="en-US" sz="3000" dirty="0" smtClean="0">
+              <a:cs typeface="Arial" panose="020B0604020202020204" pitchFamily="34" charset="0"/>
+              <a:sym typeface="Wingdings" panose="05000000000000000000" pitchFamily="2" charset="2"/>
+            </a:endParaRPr>
+          </a:p>
+          <a:p>
+            <a:pPr lvl="1"/>
+            <a:r>
+              <a:rPr lang="en-US" sz="3000" dirty="0" smtClean="0">
+                <a:cs typeface="Arial" panose="020B0604020202020204" pitchFamily="34" charset="0"/>
+                <a:sym typeface="Wingdings" panose="05000000000000000000" pitchFamily="2" charset="2"/>
+              </a:rPr>
+              <a:t>sharp changes in </a:t>
+            </a:r>
+            <a:r>
+              <a:rPr lang="en-US" sz="3000" dirty="0">
+                <a:cs typeface="Arial" panose="020B0604020202020204" pitchFamily="34" charset="0"/>
+                <a:sym typeface="Wingdings" panose="05000000000000000000" pitchFamily="2" charset="2"/>
+              </a:rPr>
+              <a:t>motion or </a:t>
+            </a:r>
+            <a:endParaRPr lang="en-US" sz="3000" dirty="0" smtClean="0">
+              <a:cs typeface="Arial" panose="020B0604020202020204" pitchFamily="34" charset="0"/>
+              <a:sym typeface="Wingdings" panose="05000000000000000000" pitchFamily="2" charset="2"/>
+            </a:endParaRPr>
+          </a:p>
+          <a:p>
+            <a:pPr lvl="1"/>
+            <a:r>
+              <a:rPr lang="en-US" sz="3000" dirty="0" smtClean="0">
+                <a:cs typeface="Arial" panose="020B0604020202020204" pitchFamily="34" charset="0"/>
+                <a:sym typeface="Wingdings" panose="05000000000000000000" pitchFamily="2" charset="2"/>
+              </a:rPr>
+              <a:t>subtle </a:t>
+            </a:r>
+            <a:r>
+              <a:rPr lang="en-US" sz="3000" dirty="0">
+                <a:cs typeface="Arial" panose="020B0604020202020204" pitchFamily="34" charset="0"/>
+                <a:sym typeface="Wingdings" panose="05000000000000000000" pitchFamily="2" charset="2"/>
+              </a:rPr>
+              <a:t>and periodic </a:t>
+            </a:r>
+            <a:r>
+              <a:rPr lang="en-US" sz="3000" dirty="0" smtClean="0">
+                <a:cs typeface="Arial" panose="020B0604020202020204" pitchFamily="34" charset="0"/>
+                <a:sym typeface="Wingdings" panose="05000000000000000000" pitchFamily="2" charset="2"/>
+              </a:rPr>
+              <a:t>motion </a:t>
+            </a:r>
+            <a:r>
+              <a:rPr lang="en-US" sz="3000" dirty="0">
+                <a:cs typeface="Arial" panose="020B0604020202020204" pitchFamily="34" charset="0"/>
+                <a:sym typeface="Wingdings" panose="05000000000000000000" pitchFamily="2" charset="2"/>
+              </a:rPr>
+              <a:t>patterns </a:t>
+            </a:r>
+            <a:endParaRPr lang="en-US" sz="3000" dirty="0" smtClean="0">
+              <a:cs typeface="Arial" panose="020B0604020202020204" pitchFamily="34" charset="0"/>
+              <a:sym typeface="Wingdings" panose="05000000000000000000" pitchFamily="2" charset="2"/>
+            </a:endParaRPr>
+          </a:p>
+          <a:p>
+            <a:pPr lvl="1"/>
+            <a:r>
+              <a:rPr lang="en-US" sz="3000" dirty="0" smtClean="0">
+                <a:cs typeface="Arial" panose="020B0604020202020204" pitchFamily="34" charset="0"/>
+                <a:sym typeface="Wingdings" panose="05000000000000000000" pitchFamily="2" charset="2"/>
+              </a:rPr>
+              <a:t>(such as stumbling while intoxicated).</a:t>
+            </a:r>
+          </a:p>
+          <a:p>
+            <a:pPr lvl="1"/>
+            <a:r>
+              <a:rPr lang="en-US" sz="3200" dirty="0" smtClean="0">
+                <a:cs typeface="Arial" panose="020B0604020202020204" pitchFamily="34" charset="0"/>
+                <a:sym typeface="Wingdings" panose="05000000000000000000" pitchFamily="2" charset="2"/>
+              </a:rPr>
+              <a:t> </a:t>
+            </a:r>
+            <a:endParaRPr lang="en-US" sz="3200" u="sng" dirty="0">
+              <a:cs typeface="Arial" panose="020B0604020202020204" pitchFamily="34" charset="0"/>
+              <a:sym typeface="Wingdings" panose="05000000000000000000" pitchFamily="2" charset="2"/>
+            </a:endParaRPr>
+          </a:p>
+          <a:p>
+            <a:pPr lvl="1"/>
+            <a:r>
+              <a:rPr lang="en-US" sz="3200" u="sng" dirty="0">
+                <a:cs typeface="Arial" panose="020B0604020202020204" pitchFamily="34" charset="0"/>
+                <a:sym typeface="Wingdings" panose="05000000000000000000" pitchFamily="2" charset="2"/>
+              </a:rPr>
+              <a:t>Gyroscope</a:t>
+            </a:r>
+            <a:r>
               <a:rPr lang="en-US" sz="3200" dirty="0">
                 <a:cs typeface="Arial" panose="020B0604020202020204" pitchFamily="34" charset="0"/>
                 <a:sym typeface="Wingdings" panose="05000000000000000000" pitchFamily="2" charset="2"/>
               </a:rPr>
-              <a:t>the value of a change in velocity for </a:t>
+              <a:t>: </a:t>
+            </a:r>
+            <a:r>
+              <a:rPr lang="en-US" sz="3000" dirty="0">
+                <a:cs typeface="Arial" panose="020B0604020202020204" pitchFamily="34" charset="0"/>
+                <a:sym typeface="Wingdings" panose="05000000000000000000" pitchFamily="2" charset="2"/>
+              </a:rPr>
+              <a:t>while the accelerometer </a:t>
             </a:r>
           </a:p>
           <a:p>
             <a:pPr lvl="1"/>
             <a:r>
-              <a:rPr lang="en-US" sz="3200" dirty="0">
-                <a:cs typeface="Arial" panose="020B0604020202020204" pitchFamily="34" charset="0"/>
-                <a:sym typeface="Wingdings" panose="05000000000000000000" pitchFamily="2" charset="2"/>
-              </a:rPr>
-              <a:t>all axes (x, y, z). This is particularly</a:t>
+              <a:rPr lang="en-US" sz="3000" dirty="0">
+                <a:cs typeface="Arial" panose="020B0604020202020204" pitchFamily="34" charset="0"/>
+                <a:sym typeface="Wingdings" panose="05000000000000000000" pitchFamily="2" charset="2"/>
+              </a:rPr>
+              <a:t>can show a change </a:t>
+            </a:r>
+            <a:r>
+              <a:rPr lang="en-US" sz="3000" dirty="0" smtClean="0">
+                <a:cs typeface="Arial" panose="020B0604020202020204" pitchFamily="34" charset="0"/>
+                <a:sym typeface="Wingdings" panose="05000000000000000000" pitchFamily="2" charset="2"/>
+              </a:rPr>
+              <a:t>in movement,</a:t>
             </a:r>
           </a:p>
           <a:p>
             <a:pPr lvl="1"/>
             <a:r>
-              <a:rPr lang="en-US" sz="3200" dirty="0">
-                <a:cs typeface="Arial" panose="020B0604020202020204" pitchFamily="34" charset="0"/>
-                <a:sym typeface="Wingdings" panose="05000000000000000000" pitchFamily="2" charset="2"/>
-              </a:rPr>
-              <a:t>useful for recording sharp changes</a:t>
+              <a:rPr lang="en-US" sz="3000" dirty="0" smtClean="0">
+                <a:cs typeface="Arial" panose="020B0604020202020204" pitchFamily="34" charset="0"/>
+                <a:sym typeface="Wingdings" panose="05000000000000000000" pitchFamily="2" charset="2"/>
+              </a:rPr>
+              <a:t>the </a:t>
+            </a:r>
+            <a:r>
+              <a:rPr lang="en-US" sz="3000" dirty="0">
+                <a:cs typeface="Arial" panose="020B0604020202020204" pitchFamily="34" charset="0"/>
+                <a:sym typeface="Wingdings" panose="05000000000000000000" pitchFamily="2" charset="2"/>
+              </a:rPr>
+              <a:t>gyroscope </a:t>
+            </a:r>
+            <a:r>
+              <a:rPr lang="en-US" sz="3000" dirty="0" smtClean="0">
+                <a:cs typeface="Arial" panose="020B0604020202020204" pitchFamily="34" charset="0"/>
+                <a:sym typeface="Wingdings" panose="05000000000000000000" pitchFamily="2" charset="2"/>
+              </a:rPr>
+              <a:t>reveals  whether</a:t>
             </a:r>
           </a:p>
           <a:p>
             <a:pPr lvl="1"/>
             <a:r>
-              <a:rPr lang="en-US" sz="3200" dirty="0">
-                <a:cs typeface="Arial" panose="020B0604020202020204" pitchFamily="34" charset="0"/>
-                <a:sym typeface="Wingdings" panose="05000000000000000000" pitchFamily="2" charset="2"/>
-              </a:rPr>
-              <a:t>in motion or subtle and periodic </a:t>
+              <a:rPr lang="en-US" sz="3000" dirty="0" smtClean="0">
+                <a:cs typeface="Arial" panose="020B0604020202020204" pitchFamily="34" charset="0"/>
+                <a:sym typeface="Wingdings" panose="05000000000000000000" pitchFamily="2" charset="2"/>
+              </a:rPr>
+              <a:t> </a:t>
+            </a:r>
+            <a:r>
+              <a:rPr lang="en-US" sz="3000" dirty="0">
+                <a:cs typeface="Arial" panose="020B0604020202020204" pitchFamily="34" charset="0"/>
+                <a:sym typeface="Wingdings" panose="05000000000000000000" pitchFamily="2" charset="2"/>
+              </a:rPr>
+              <a:t>the orientation of the </a:t>
             </a:r>
           </a:p>
           <a:p>
             <a:pPr lvl="1"/>
             <a:r>
-              <a:rPr lang="en-US" sz="3200" dirty="0">
-                <a:cs typeface="Arial" panose="020B0604020202020204" pitchFamily="34" charset="0"/>
-                <a:sym typeface="Wingdings" panose="05000000000000000000" pitchFamily="2" charset="2"/>
-              </a:rPr>
-              <a:t>motion patterns (for example</a:t>
+              <a:rPr lang="en-US" sz="3000" dirty="0">
+                <a:cs typeface="Arial" panose="020B0604020202020204" pitchFamily="34" charset="0"/>
+                <a:sym typeface="Wingdings" panose="05000000000000000000" pitchFamily="2" charset="2"/>
+              </a:rPr>
+              <a:t>individual has changed</a:t>
+            </a:r>
+            <a:r>
+              <a:rPr lang="en-US" sz="3000" dirty="0" smtClean="0">
+                <a:cs typeface="Arial" panose="020B0604020202020204" pitchFamily="34" charset="0"/>
+                <a:sym typeface="Wingdings" panose="05000000000000000000" pitchFamily="2" charset="2"/>
+              </a:rPr>
+              <a:t>. Again, our goal was to capture</a:t>
             </a:r>
           </a:p>
           <a:p>
             <a:pPr lvl="1"/>
             <a:r>
-              <a:rPr lang="en-US" sz="3200" dirty="0">
-                <a:cs typeface="Arial" panose="020B0604020202020204" pitchFamily="34" charset="0"/>
-                <a:sym typeface="Wingdings" panose="05000000000000000000" pitchFamily="2" charset="2"/>
-              </a:rPr>
-              <a:t>swaying due to a high intoxication level).</a:t>
-            </a:r>
+              <a:rPr lang="en-US" sz="3000" dirty="0" smtClean="0">
+                <a:cs typeface="Arial" panose="020B0604020202020204" pitchFamily="34" charset="0"/>
+                <a:sym typeface="Wingdings" panose="05000000000000000000" pitchFamily="2" charset="2"/>
+              </a:rPr>
+              <a:t>overall postural sway, so we used the magnitude of the</a:t>
+            </a:r>
+          </a:p>
+          <a:p>
+            <a:pPr lvl="1"/>
+            <a:r>
+              <a:rPr lang="en-US" sz="3000" dirty="0">
+                <a:cs typeface="Arial" panose="020B0604020202020204" pitchFamily="34" charset="0"/>
+                <a:sym typeface="Wingdings" panose="05000000000000000000" pitchFamily="2" charset="2"/>
+              </a:rPr>
+              <a:t>g</a:t>
+            </a:r>
+            <a:r>
+              <a:rPr lang="en-US" sz="3000" dirty="0" smtClean="0">
+                <a:cs typeface="Arial" panose="020B0604020202020204" pitchFamily="34" charset="0"/>
+                <a:sym typeface="Wingdings" panose="05000000000000000000" pitchFamily="2" charset="2"/>
+              </a:rPr>
+              <a:t>yroscope vector as our second feature.</a:t>
+            </a:r>
+            <a:endParaRPr lang="en-US" sz="3000" dirty="0">
+              <a:cs typeface="Arial" panose="020B0604020202020204" pitchFamily="34" charset="0"/>
+              <a:sym typeface="Wingdings" panose="05000000000000000000" pitchFamily="2" charset="2"/>
+            </a:endParaRPr>
           </a:p>
           <a:p>
             <a:pPr lvl="1"/>
@@ -4064,100 +4471,58 @@
                 <a:cs typeface="Arial" panose="020B0604020202020204" pitchFamily="34" charset="0"/>
                 <a:sym typeface="Wingdings" panose="05000000000000000000" pitchFamily="2" charset="2"/>
               </a:rPr>
-              <a:t>Gyroscope</a:t>
+              <a:t>Three Word Prompt</a:t>
             </a:r>
             <a:r>
               <a:rPr lang="en-US" sz="3200" dirty="0">
                 <a:cs typeface="Arial" panose="020B0604020202020204" pitchFamily="34" charset="0"/>
                 <a:sym typeface="Wingdings" panose="05000000000000000000" pitchFamily="2" charset="2"/>
               </a:rPr>
-              <a:t>: while the accelerometer </a:t>
-            </a:r>
-          </a:p>
-          <a:p>
-            <a:pPr lvl="1"/>
-            <a:r>
-              <a:rPr lang="en-US" sz="3200" dirty="0">
-                <a:cs typeface="Arial" panose="020B0604020202020204" pitchFamily="34" charset="0"/>
-                <a:sym typeface="Wingdings" panose="05000000000000000000" pitchFamily="2" charset="2"/>
-              </a:rPr>
-              <a:t>can show a change in the direction </a:t>
-            </a:r>
-          </a:p>
-          <a:p>
-            <a:pPr lvl="1"/>
-            <a:r>
-              <a:rPr lang="en-US" sz="3200" dirty="0">
-                <a:cs typeface="Arial" panose="020B0604020202020204" pitchFamily="34" charset="0"/>
-                <a:sym typeface="Wingdings" panose="05000000000000000000" pitchFamily="2" charset="2"/>
-              </a:rPr>
-              <a:t>of movement, the gyroscope reveals</a:t>
-            </a:r>
-          </a:p>
-          <a:p>
-            <a:pPr lvl="1"/>
-            <a:r>
-              <a:rPr lang="en-US" sz="3200" dirty="0">
-                <a:cs typeface="Arial" panose="020B0604020202020204" pitchFamily="34" charset="0"/>
-                <a:sym typeface="Wingdings" panose="05000000000000000000" pitchFamily="2" charset="2"/>
-              </a:rPr>
-              <a:t> whether the orientation of the </a:t>
-            </a:r>
-          </a:p>
-          <a:p>
-            <a:pPr lvl="1"/>
-            <a:r>
-              <a:rPr lang="en-US" sz="3200" dirty="0">
-                <a:cs typeface="Arial" panose="020B0604020202020204" pitchFamily="34" charset="0"/>
-                <a:sym typeface="Wingdings" panose="05000000000000000000" pitchFamily="2" charset="2"/>
-              </a:rPr>
-              <a:t>individual has changed. This </a:t>
-            </a:r>
-          </a:p>
-          <a:p>
-            <a:pPr lvl="1"/>
-            <a:r>
-              <a:rPr lang="en-US" sz="3200" dirty="0">
-                <a:cs typeface="Arial" panose="020B0604020202020204" pitchFamily="34" charset="0"/>
-                <a:sym typeface="Wingdings" panose="05000000000000000000" pitchFamily="2" charset="2"/>
-              </a:rPr>
-              <a:t>information is useful in that a </a:t>
-            </a:r>
-          </a:p>
-          <a:p>
-            <a:pPr lvl="1"/>
-            <a:r>
-              <a:rPr lang="en-US" sz="3200" dirty="0">
-                <a:cs typeface="Arial" panose="020B0604020202020204" pitchFamily="34" charset="0"/>
-                <a:sym typeface="Wingdings" panose="05000000000000000000" pitchFamily="2" charset="2"/>
-              </a:rPr>
-              <a:t>user could be stumbling and become disoriented due to a high intoxication level.</a:t>
-            </a:r>
-          </a:p>
-          <a:p>
-            <a:pPr lvl="1"/>
-            <a:endParaRPr lang="en-US" sz="3200" u="sng" dirty="0">
-              <a:cs typeface="Arial" panose="020B0604020202020204" pitchFamily="34" charset="0"/>
-              <a:sym typeface="Wingdings" panose="05000000000000000000" pitchFamily="2" charset="2"/>
-            </a:endParaRPr>
-          </a:p>
-          <a:p>
-            <a:pPr lvl="1"/>
-            <a:r>
-              <a:rPr lang="en-US" sz="3200" u="sng" dirty="0">
-                <a:cs typeface="Arial" panose="020B0604020202020204" pitchFamily="34" charset="0"/>
-                <a:sym typeface="Wingdings" panose="05000000000000000000" pitchFamily="2" charset="2"/>
-              </a:rPr>
-              <a:t>Three Word Prompt</a:t>
-            </a:r>
-            <a:r>
-              <a:rPr lang="en-US" sz="3200" dirty="0">
-                <a:cs typeface="Arial" panose="020B0604020202020204" pitchFamily="34" charset="0"/>
-                <a:sym typeface="Wingdings" panose="05000000000000000000" pitchFamily="2" charset="2"/>
-              </a:rPr>
-              <a:t>: Although not currently integrated with our model, the typing accuracy of users who are intoxicated tends to greatly differ from the accuracy of users who are sober. In order to simulate this, the app has the ability to prompt the user with a randomly generated three word string. The user input along with the “correct” string is compared using minimum edit distance, also known as Levenshtein distance. This distance metric works by assigning a cost to each of the three options: inserting a character, deleting a character, and substituting a character. The algorithm returns an integer metric that we can then use to determine how far off the user input was to the correct answer.</a:t>
-            </a:r>
-            <a:endParaRPr lang="en-US" sz="3200" u="sng" dirty="0">
+              <a:t>: </a:t>
+            </a:r>
+            <a:r>
+              <a:rPr lang="en-US" sz="3000" dirty="0">
+                <a:cs typeface="Arial" panose="020B0604020202020204" pitchFamily="34" charset="0"/>
+                <a:sym typeface="Wingdings" panose="05000000000000000000" pitchFamily="2" charset="2"/>
+              </a:rPr>
+              <a:t>Although not currently integrated with our model, the typing accuracy of users who are intoxicated tends to greatly differ from the accuracy of users who are sober. In order to simulate this, the app has the ability to prompt the user with a randomly generated three word string. The user input along with the “correct” string is </a:t>
+            </a:r>
+            <a:r>
+              <a:rPr lang="en-US" sz="3000" dirty="0" smtClean="0">
+                <a:cs typeface="Arial" panose="020B0604020202020204" pitchFamily="34" charset="0"/>
+                <a:sym typeface="Wingdings" panose="05000000000000000000" pitchFamily="2" charset="2"/>
+              </a:rPr>
+              <a:t>recorded, and we then compute the minimum edit distance between the two strings, using </a:t>
+            </a:r>
+            <a:r>
+              <a:rPr lang="en-US" sz="3000" dirty="0">
+                <a:cs typeface="Arial" panose="020B0604020202020204" pitchFamily="34" charset="0"/>
+                <a:sym typeface="Wingdings" panose="05000000000000000000" pitchFamily="2" charset="2"/>
+              </a:rPr>
+              <a:t>the </a:t>
+            </a:r>
+            <a:r>
+              <a:rPr lang="en-US" sz="3000" dirty="0" err="1" smtClean="0">
+                <a:cs typeface="Arial" panose="020B0604020202020204" pitchFamily="34" charset="0"/>
+                <a:sym typeface="Wingdings" panose="05000000000000000000" pitchFamily="2" charset="2"/>
+              </a:rPr>
+              <a:t>Levenshtein</a:t>
+            </a:r>
+            <a:r>
+              <a:rPr lang="en-US" sz="3000" dirty="0" smtClean="0">
+                <a:cs typeface="Arial" panose="020B0604020202020204" pitchFamily="34" charset="0"/>
+                <a:sym typeface="Wingdings" panose="05000000000000000000" pitchFamily="2" charset="2"/>
+              </a:rPr>
+              <a:t> Distance </a:t>
+            </a:r>
+            <a:r>
+              <a:rPr lang="en-US" sz="3000" dirty="0" smtClean="0">
+                <a:cs typeface="Arial" panose="020B0604020202020204" pitchFamily="34" charset="0"/>
+                <a:sym typeface="Wingdings" panose="05000000000000000000" pitchFamily="2" charset="2"/>
+              </a:rPr>
+              <a:t>Algorithm. This allows us to to quantifiably determine how many mistakes were made when the user tried to enter the input string, which we use as our third feature and final feature for classification.</a:t>
+            </a:r>
+            <a:endParaRPr lang="en-US" sz="3000" u="sng" dirty="0">
               <a:cs typeface="Arial" panose="020B0604020202020204" pitchFamily="34" charset="0"/>
               <a:sym typeface="Wingdings" panose="05000000000000000000" pitchFamily="2" charset="2"/>
             </a:endParaRPr>
@@ -4169,7 +4534,7 @@
           <p:cNvPr id="36" name="Picture 35">
             <a:extLst>
               <a:ext uri="{FF2B5EF4-FFF2-40B4-BE49-F238E27FC236}">
-                <a16:creationId xmlns:a16="http://schemas.microsoft.com/office/drawing/2014/main" id="{5EB94CEA-FB5B-4368-A30E-50290BF0F0F2}"/>
+                <a16:creationId xmlns:a16="http://schemas.microsoft.com/office/drawing/2014/main" xmlns="" id="{5EB94CEA-FB5B-4368-A30E-50290BF0F0F2}"/>
               </a:ext>
             </a:extLst>
           </p:cNvPr>
@@ -4205,7 +4570,7 @@
           <p:cNvPr id="38" name="Picture 37">
             <a:extLst>
               <a:ext uri="{FF2B5EF4-FFF2-40B4-BE49-F238E27FC236}">
-                <a16:creationId xmlns:a16="http://schemas.microsoft.com/office/drawing/2014/main" id="{0A955D61-C96A-4233-9E84-FFE179DE9320}"/>
+                <a16:creationId xmlns:a16="http://schemas.microsoft.com/office/drawing/2014/main" xmlns="" id="{0A955D61-C96A-4233-9E84-FFE179DE9320}"/>
               </a:ext>
             </a:extLst>
           </p:cNvPr>
@@ -4241,7 +4606,7 @@
           <p:cNvPr id="40" name="Picture 39">
             <a:extLst>
               <a:ext uri="{FF2B5EF4-FFF2-40B4-BE49-F238E27FC236}">
-                <a16:creationId xmlns:a16="http://schemas.microsoft.com/office/drawing/2014/main" id="{AE469F4F-19FC-4C40-BD07-AD7135BC0AAC}"/>
+                <a16:creationId xmlns:a16="http://schemas.microsoft.com/office/drawing/2014/main" xmlns="" id="{AE469F4F-19FC-4C40-BD07-AD7135BC0AAC}"/>
               </a:ext>
             </a:extLst>
           </p:cNvPr>
@@ -4277,7 +4642,7 @@
           <p:cNvPr id="42" name="Picture 41">
             <a:extLst>
               <a:ext uri="{FF2B5EF4-FFF2-40B4-BE49-F238E27FC236}">
-                <a16:creationId xmlns:a16="http://schemas.microsoft.com/office/drawing/2014/main" id="{2E1E7669-C611-4883-9703-423B58F4A31A}"/>
+                <a16:creationId xmlns:a16="http://schemas.microsoft.com/office/drawing/2014/main" xmlns="" id="{2E1E7669-C611-4883-9703-423B58F4A31A}"/>
               </a:ext>
             </a:extLst>
           </p:cNvPr>
@@ -4313,7 +4678,7 @@
           <p:cNvPr id="44" name="Picture 43">
             <a:extLst>
               <a:ext uri="{FF2B5EF4-FFF2-40B4-BE49-F238E27FC236}">
-                <a16:creationId xmlns:a16="http://schemas.microsoft.com/office/drawing/2014/main" id="{8E7DFBD4-C4F4-42C3-BAA0-3DB171C45C1A}"/>
+                <a16:creationId xmlns:a16="http://schemas.microsoft.com/office/drawing/2014/main" xmlns="" id="{8E7DFBD4-C4F4-42C3-BAA0-3DB171C45C1A}"/>
               </a:ext>
             </a:extLst>
           </p:cNvPr>

</xml_diff>